<commit_message>
Added modifications to testing
</commit_message>
<xml_diff>
--- a/docs/local_present.pptx
+++ b/docs/local_present.pptx
@@ -869,6 +869,13 @@
     <dgm:pt modelId="{78A1E8F4-D03D-CF48-8943-6DE58C206D5A}" type="doc">
       <dgm:prSet loTypeId="urn:microsoft.com/office/officeart/2005/8/layout/arrow2" loCatId="" qsTypeId="urn:microsoft.com/office/officeart/2005/8/quickstyle/simple4" qsCatId="simple" csTypeId="urn:microsoft.com/office/officeart/2005/8/colors/accent1_2" csCatId="accent1" phldr="1"/>
       <dgm:spPr/>
+      <dgm:t>
+        <a:bodyPr/>
+        <a:lstStyle/>
+        <a:p>
+          <a:endParaRPr lang="en-US"/>
+        </a:p>
+      </dgm:t>
     </dgm:pt>
     <dgm:pt modelId="{F74E1E6B-6207-4C49-8AA0-22A4F15A5057}">
       <dgm:prSet phldrT="[Text]" custT="1"/>
@@ -1041,7 +1048,7 @@
       <dgm:spPr/>
     </dgm:pt>
     <dgm:pt modelId="{FC1CBA4E-6E2F-EE48-861D-3EDED8DB6870}" type="pres">
-      <dgm:prSet presAssocID="{F74E1E6B-6207-4C49-8AA0-22A4F15A5057}" presName="textBox4a" presStyleLbl="revTx" presStyleIdx="0" presStyleCnt="4" custLinFactNeighborX="-69586" custLinFactNeighborY="-46663">
+      <dgm:prSet presAssocID="{F74E1E6B-6207-4C49-8AA0-22A4F15A5057}" presName="textBox4a" presStyleLbl="revTx" presStyleIdx="0" presStyleCnt="4" custLinFactNeighborX="-72844" custLinFactNeighborY="-14832">
         <dgm:presLayoutVars>
           <dgm:bulletEnabled val="1"/>
         </dgm:presLayoutVars>
@@ -1056,11 +1063,18 @@
       </dgm:t>
     </dgm:pt>
     <dgm:pt modelId="{4E795342-5CEB-254F-93C0-F21C37FBF700}" type="pres">
-      <dgm:prSet presAssocID="{40C8586C-B50B-0645-AD8E-8CB09C38AECA}" presName="bullet4b" presStyleLbl="node1" presStyleIdx="1" presStyleCnt="4" custLinFactX="-98312" custLinFactNeighborX="-100000" custLinFactNeighborY="-90893"/>
+      <dgm:prSet presAssocID="{40C8586C-B50B-0645-AD8E-8CB09C38AECA}" presName="bullet4b" presStyleLbl="node1" presStyleIdx="1" presStyleCnt="4" custLinFactX="-193304" custLinFactNeighborX="-200000" custLinFactNeighborY="41406"/>
       <dgm:spPr/>
+      <dgm:t>
+        <a:bodyPr/>
+        <a:lstStyle/>
+        <a:p>
+          <a:endParaRPr lang="en-US"/>
+        </a:p>
+      </dgm:t>
     </dgm:pt>
     <dgm:pt modelId="{8A30EBEC-BCB4-5F4D-B7DF-22527C033D70}" type="pres">
-      <dgm:prSet presAssocID="{40C8586C-B50B-0645-AD8E-8CB09C38AECA}" presName="textBox4b" presStyleLbl="revTx" presStyleIdx="1" presStyleCnt="4" custLinFactNeighborX="-33054" custLinFactNeighborY="-24297">
+      <dgm:prSet presAssocID="{40C8586C-B50B-0645-AD8E-8CB09C38AECA}" presName="textBox4b" presStyleLbl="revTx" presStyleIdx="1" presStyleCnt="4" custLinFactNeighborX="-72848" custLinFactNeighborY="-11620">
         <dgm:presLayoutVars>
           <dgm:bulletEnabled val="1"/>
         </dgm:presLayoutVars>
@@ -1075,11 +1089,11 @@
       </dgm:t>
     </dgm:pt>
     <dgm:pt modelId="{1F362D53-1775-5B45-A19E-0CEA8694CFFA}" type="pres">
-      <dgm:prSet presAssocID="{E90090C8-5943-F040-9633-B1B97AE23E5D}" presName="bullet4c" presStyleLbl="node1" presStyleIdx="2" presStyleCnt="4" custLinFactNeighborX="74838" custLinFactNeighborY="-16929"/>
+      <dgm:prSet presAssocID="{E90090C8-5943-F040-9633-B1B97AE23E5D}" presName="bullet4c" presStyleLbl="node1" presStyleIdx="2" presStyleCnt="4" custLinFactX="100000" custLinFactNeighborX="127258" custLinFactNeighborY="-22410"/>
       <dgm:spPr/>
     </dgm:pt>
     <dgm:pt modelId="{F3C5ACA4-15AE-564E-83B5-CFFBDB844666}" type="pres">
-      <dgm:prSet presAssocID="{E90090C8-5943-F040-9633-B1B97AE23E5D}" presName="textBox4c" presStyleLbl="revTx" presStyleIdx="2" presStyleCnt="4" custLinFactNeighborX="25184" custLinFactNeighborY="-9184">
+      <dgm:prSet presAssocID="{E90090C8-5943-F040-9633-B1B97AE23E5D}" presName="textBox4c" presStyleLbl="revTx" presStyleIdx="2" presStyleCnt="4" custScaleY="82523" custLinFactNeighborX="59669" custLinFactNeighborY="-14943">
         <dgm:presLayoutVars>
           <dgm:bulletEnabled val="1"/>
         </dgm:presLayoutVars>
@@ -1098,7 +1112,7 @@
       <dgm:spPr/>
     </dgm:pt>
     <dgm:pt modelId="{4A2DFF65-509A-544C-9393-D04075A243CD}" type="pres">
-      <dgm:prSet presAssocID="{BE88FEAD-BFE7-E34C-BCF5-4BA41C0939D4}" presName="textBox4d" presStyleLbl="revTx" presStyleIdx="3" presStyleCnt="4" custScaleX="150419" custScaleY="92625" custLinFactNeighborX="80274" custLinFactNeighborY="3688">
+      <dgm:prSet presAssocID="{BE88FEAD-BFE7-E34C-BCF5-4BA41C0939D4}" presName="textBox4d" presStyleLbl="revTx" presStyleIdx="3" presStyleCnt="4" custScaleX="150419" custScaleY="81697" custLinFactNeighborX="79017" custLinFactNeighborY="-6370">
         <dgm:presLayoutVars>
           <dgm:bulletEnabled val="1"/>
         </dgm:presLayoutVars>
@@ -1114,15 +1128,15 @@
     </dgm:pt>
   </dgm:ptLst>
   <dgm:cxnLst>
-    <dgm:cxn modelId="{632C7F91-17B3-EC43-8D9F-BEDA457231F2}" srcId="{78A1E8F4-D03D-CF48-8943-6DE58C206D5A}" destId="{E90090C8-5943-F040-9633-B1B97AE23E5D}" srcOrd="2" destOrd="0" parTransId="{2FA0ADF9-CDA9-554C-8E99-FF053E5DA4CC}" sibTransId="{5E64DACA-D4B3-264A-BBD0-E39BE5657CE2}"/>
+    <dgm:cxn modelId="{CAE30B11-CC2A-154F-8816-60E1EA34C7C5}" type="presOf" srcId="{F74E1E6B-6207-4C49-8AA0-22A4F15A5057}" destId="{FC1CBA4E-6E2F-EE48-861D-3EDED8DB6870}" srcOrd="0" destOrd="0" presId="urn:microsoft.com/office/officeart/2005/8/layout/arrow2"/>
+    <dgm:cxn modelId="{14286A4A-3840-3A4A-9C4F-3CAE3CC8677B}" type="presOf" srcId="{78A1E8F4-D03D-CF48-8943-6DE58C206D5A}" destId="{04A6350A-5479-734D-B89B-58D612C6A7CF}" srcOrd="0" destOrd="0" presId="urn:microsoft.com/office/officeart/2005/8/layout/arrow2"/>
     <dgm:cxn modelId="{9B8B400C-3478-EC45-AE8F-FD6185D62D6E}" srcId="{78A1E8F4-D03D-CF48-8943-6DE58C206D5A}" destId="{F74E1E6B-6207-4C49-8AA0-22A4F15A5057}" srcOrd="0" destOrd="0" parTransId="{7FE7242A-A03D-284D-9AAC-989494308C86}" sibTransId="{AB09869F-DD0F-5744-AF56-BD66C760C450}"/>
-    <dgm:cxn modelId="{B12CC9F1-F25C-324B-9821-8FDFE7DCFC59}" srcId="{78A1E8F4-D03D-CF48-8943-6DE58C206D5A}" destId="{BE88FEAD-BFE7-E34C-BCF5-4BA41C0939D4}" srcOrd="3" destOrd="0" parTransId="{BEDDEB86-AD04-B449-92C3-631EF3DAB54E}" sibTransId="{809877BC-99BF-F541-8046-500E2E05F0AD}"/>
-    <dgm:cxn modelId="{CAE30B11-CC2A-154F-8816-60E1EA34C7C5}" type="presOf" srcId="{F74E1E6B-6207-4C49-8AA0-22A4F15A5057}" destId="{FC1CBA4E-6E2F-EE48-861D-3EDED8DB6870}" srcOrd="0" destOrd="0" presId="urn:microsoft.com/office/officeart/2005/8/layout/arrow2"/>
     <dgm:cxn modelId="{FAD75357-6883-9246-B989-F0EAC5059462}" type="presOf" srcId="{BE88FEAD-BFE7-E34C-BCF5-4BA41C0939D4}" destId="{4A2DFF65-509A-544C-9393-D04075A243CD}" srcOrd="0" destOrd="0" presId="urn:microsoft.com/office/officeart/2005/8/layout/arrow2"/>
     <dgm:cxn modelId="{E512AC72-1457-444A-8463-06B229732841}" srcId="{78A1E8F4-D03D-CF48-8943-6DE58C206D5A}" destId="{40C8586C-B50B-0645-AD8E-8CB09C38AECA}" srcOrd="1" destOrd="0" parTransId="{4324FEA0-05B9-A949-9C16-54BD0AFE50B1}" sibTransId="{016AD713-C304-014B-A008-BAEA553254F5}"/>
+    <dgm:cxn modelId="{632C7F91-17B3-EC43-8D9F-BEDA457231F2}" srcId="{78A1E8F4-D03D-CF48-8943-6DE58C206D5A}" destId="{E90090C8-5943-F040-9633-B1B97AE23E5D}" srcOrd="2" destOrd="0" parTransId="{2FA0ADF9-CDA9-554C-8E99-FF053E5DA4CC}" sibTransId="{5E64DACA-D4B3-264A-BBD0-E39BE5657CE2}"/>
+    <dgm:cxn modelId="{833818DA-5101-BA48-B94A-D284ED81F244}" type="presOf" srcId="{E90090C8-5943-F040-9633-B1B97AE23E5D}" destId="{F3C5ACA4-15AE-564E-83B5-CFFBDB844666}" srcOrd="0" destOrd="0" presId="urn:microsoft.com/office/officeart/2005/8/layout/arrow2"/>
     <dgm:cxn modelId="{3C4E6C1D-1F8C-494E-B997-7BE74D54A3F4}" type="presOf" srcId="{40C8586C-B50B-0645-AD8E-8CB09C38AECA}" destId="{8A30EBEC-BCB4-5F4D-B7DF-22527C033D70}" srcOrd="0" destOrd="0" presId="urn:microsoft.com/office/officeart/2005/8/layout/arrow2"/>
-    <dgm:cxn modelId="{833818DA-5101-BA48-B94A-D284ED81F244}" type="presOf" srcId="{E90090C8-5943-F040-9633-B1B97AE23E5D}" destId="{F3C5ACA4-15AE-564E-83B5-CFFBDB844666}" srcOrd="0" destOrd="0" presId="urn:microsoft.com/office/officeart/2005/8/layout/arrow2"/>
-    <dgm:cxn modelId="{14286A4A-3840-3A4A-9C4F-3CAE3CC8677B}" type="presOf" srcId="{78A1E8F4-D03D-CF48-8943-6DE58C206D5A}" destId="{04A6350A-5479-734D-B89B-58D612C6A7CF}" srcOrd="0" destOrd="0" presId="urn:microsoft.com/office/officeart/2005/8/layout/arrow2"/>
+    <dgm:cxn modelId="{B12CC9F1-F25C-324B-9821-8FDFE7DCFC59}" srcId="{78A1E8F4-D03D-CF48-8943-6DE58C206D5A}" destId="{BE88FEAD-BFE7-E34C-BCF5-4BA41C0939D4}" srcOrd="3" destOrd="0" parTransId="{BEDDEB86-AD04-B449-92C3-631EF3DAB54E}" sibTransId="{809877BC-99BF-F541-8046-500E2E05F0AD}"/>
     <dgm:cxn modelId="{65866AB4-D3ED-A548-894C-4B4A98D610BC}" type="presParOf" srcId="{04A6350A-5479-734D-B89B-58D612C6A7CF}" destId="{42224D65-0275-CB45-8546-C7B6A8995E25}" srcOrd="0" destOrd="0" presId="urn:microsoft.com/office/officeart/2005/8/layout/arrow2"/>
     <dgm:cxn modelId="{85E1247F-0FDD-2147-AA2A-22C8FCA6C6EC}" type="presParOf" srcId="{04A6350A-5479-734D-B89B-58D612C6A7CF}" destId="{81D78D91-6403-3E4F-9398-B2B69D4255E4}" srcOrd="1" destOrd="0" presId="urn:microsoft.com/office/officeart/2005/8/layout/arrow2"/>
     <dgm:cxn modelId="{4DD1DD6B-7A2F-984E-9F8D-D68054BCDA62}" type="presParOf" srcId="{81D78D91-6403-3E4F-9398-B2B69D4255E4}" destId="{12253921-DF7F-164A-ACD8-7BFE2B59D4EA}" srcOrd="0" destOrd="0" presId="urn:microsoft.com/office/officeart/2005/8/layout/arrow2"/>
@@ -1274,7 +1288,7 @@
       </dsp:nvSpPr>
       <dsp:spPr>
         <a:xfrm>
-          <a:off x="1831242" y="2084255"/>
+          <a:off x="1802700" y="2326825"/>
           <a:ext cx="876041" cy="762053"/>
         </a:xfrm>
         <a:prstGeom prst="rect">
@@ -1323,7 +1337,7 @@
         </a:p>
       </dsp:txBody>
       <dsp:txXfrm>
-        <a:off x="1831242" y="2084255"/>
+        <a:off x="1802700" y="2326825"/>
         <a:ext cx="876041" cy="762053"/>
       </dsp:txXfrm>
     </dsp:sp>
@@ -1334,7 +1348,7 @@
       </dsp:nvSpPr>
       <dsp:spPr>
         <a:xfrm>
-          <a:off x="2808040" y="1449914"/>
+          <a:off x="2408458" y="1721024"/>
           <a:ext cx="204922" cy="204922"/>
         </a:xfrm>
         <a:prstGeom prst="ellipse">
@@ -1400,7 +1414,7 @@
       </dsp:nvSpPr>
       <dsp:spPr>
         <a:xfrm>
-          <a:off x="2961277" y="1383104"/>
+          <a:off x="2533157" y="1568603"/>
           <a:ext cx="1075840" cy="1463271"/>
         </a:xfrm>
         <a:prstGeom prst="rect">
@@ -1449,7 +1463,7 @@
         </a:p>
       </dsp:txBody>
       <dsp:txXfrm>
-        <a:off x="2961277" y="1383104"/>
+        <a:off x="2533157" y="1568603"/>
         <a:ext cx="1075840" cy="1463271"/>
       </dsp:txXfrm>
     </dsp:sp>
@@ -1460,7 +1474,7 @@
       </dsp:nvSpPr>
       <dsp:spPr>
         <a:xfrm>
-          <a:off x="4480659" y="1041401"/>
+          <a:off x="4894513" y="1026519"/>
           <a:ext cx="271521" cy="271521"/>
         </a:xfrm>
         <a:prstGeom prst="ellipse">
@@ -1526,8 +1540,8 @@
       </dsp:nvSpPr>
       <dsp:spPr>
         <a:xfrm>
-          <a:off x="4684158" y="1041397"/>
-          <a:ext cx="1075840" cy="1978778"/>
+          <a:off x="5055162" y="1100355"/>
+          <a:ext cx="1075840" cy="1632947"/>
         </a:xfrm>
         <a:prstGeom prst="rect">
           <a:avLst/>
@@ -1575,8 +1589,8 @@
         </a:p>
       </dsp:txBody>
       <dsp:txXfrm>
-        <a:off x="4684158" y="1041397"/>
-        <a:ext cx="1075840" cy="1978778"/>
+        <a:off x="5055162" y="1100355"/>
+        <a:ext cx="1075840" cy="1632947"/>
       </dsp:txXfrm>
     </dsp:sp>
     <dsp:sp modelId="{C47A665F-D677-714D-B9DF-78EFBAC6EE07}">
@@ -1652,8 +1666,8 @@
       </dsp:nvSpPr>
       <dsp:spPr>
         <a:xfrm>
-          <a:off x="6209542" y="1075452"/>
-          <a:ext cx="1618268" cy="2126454"/>
+          <a:off x="6196019" y="969996"/>
+          <a:ext cx="1618268" cy="1875573"/>
         </a:xfrm>
         <a:prstGeom prst="rect">
           <a:avLst/>
@@ -1701,8 +1715,8 @@
         </a:p>
       </dsp:txBody>
       <dsp:txXfrm>
-        <a:off x="6209542" y="1075452"/>
-        <a:ext cx="1618268" cy="2126454"/>
+        <a:off x="6196019" y="969996"/>
+        <a:ext cx="1618268" cy="1875573"/>
       </dsp:txXfrm>
     </dsp:sp>
   </dsp:spTree>
@@ -4569,7 +4583,7 @@
           <a:p>
             <a:fld id="{12D17103-1748-4847-B931-A66DCC960259}" type="datetimeFigureOut">
               <a:rPr lang="en-US" smtClean="0"/>
-              <a:t>4/11/12</a:t>
+              <a:t>5/5/12</a:t>
             </a:fld>
             <a:endParaRPr lang="en-US"/>
           </a:p>
@@ -4739,7 +4753,7 @@
           <a:p>
             <a:fld id="{12D17103-1748-4847-B931-A66DCC960259}" type="datetimeFigureOut">
               <a:rPr lang="en-US" smtClean="0"/>
-              <a:t>4/11/12</a:t>
+              <a:t>5/5/12</a:t>
             </a:fld>
             <a:endParaRPr lang="en-US"/>
           </a:p>
@@ -4919,7 +4933,7 @@
           <a:p>
             <a:fld id="{12D17103-1748-4847-B931-A66DCC960259}" type="datetimeFigureOut">
               <a:rPr lang="en-US" smtClean="0"/>
-              <a:t>4/11/12</a:t>
+              <a:t>5/5/12</a:t>
             </a:fld>
             <a:endParaRPr lang="en-US"/>
           </a:p>
@@ -5089,7 +5103,7 @@
           <a:p>
             <a:fld id="{12D17103-1748-4847-B931-A66DCC960259}" type="datetimeFigureOut">
               <a:rPr lang="en-US" smtClean="0"/>
-              <a:t>4/11/12</a:t>
+              <a:t>5/5/12</a:t>
             </a:fld>
             <a:endParaRPr lang="en-US"/>
           </a:p>
@@ -5335,7 +5349,7 @@
           <a:p>
             <a:fld id="{12D17103-1748-4847-B931-A66DCC960259}" type="datetimeFigureOut">
               <a:rPr lang="en-US" smtClean="0"/>
-              <a:t>4/11/12</a:t>
+              <a:t>5/5/12</a:t>
             </a:fld>
             <a:endParaRPr lang="en-US"/>
           </a:p>
@@ -5623,7 +5637,7 @@
           <a:p>
             <a:fld id="{12D17103-1748-4847-B931-A66DCC960259}" type="datetimeFigureOut">
               <a:rPr lang="en-US" smtClean="0"/>
-              <a:t>4/11/12</a:t>
+              <a:t>5/5/12</a:t>
             </a:fld>
             <a:endParaRPr lang="en-US"/>
           </a:p>
@@ -6045,7 +6059,7 @@
           <a:p>
             <a:fld id="{12D17103-1748-4847-B931-A66DCC960259}" type="datetimeFigureOut">
               <a:rPr lang="en-US" smtClean="0"/>
-              <a:t>4/11/12</a:t>
+              <a:t>5/5/12</a:t>
             </a:fld>
             <a:endParaRPr lang="en-US"/>
           </a:p>
@@ -6163,7 +6177,7 @@
           <a:p>
             <a:fld id="{12D17103-1748-4847-B931-A66DCC960259}" type="datetimeFigureOut">
               <a:rPr lang="en-US" smtClean="0"/>
-              <a:t>4/11/12</a:t>
+              <a:t>5/5/12</a:t>
             </a:fld>
             <a:endParaRPr lang="en-US"/>
           </a:p>
@@ -6258,7 +6272,7 @@
           <a:p>
             <a:fld id="{12D17103-1748-4847-B931-A66DCC960259}" type="datetimeFigureOut">
               <a:rPr lang="en-US" smtClean="0"/>
-              <a:t>4/11/12</a:t>
+              <a:t>5/5/12</a:t>
             </a:fld>
             <a:endParaRPr lang="en-US"/>
           </a:p>
@@ -6535,7 +6549,7 @@
           <a:p>
             <a:fld id="{12D17103-1748-4847-B931-A66DCC960259}" type="datetimeFigureOut">
               <a:rPr lang="en-US" smtClean="0"/>
-              <a:t>4/11/12</a:t>
+              <a:t>5/5/12</a:t>
             </a:fld>
             <a:endParaRPr lang="en-US"/>
           </a:p>
@@ -6788,7 +6802,7 @@
           <a:p>
             <a:fld id="{12D17103-1748-4847-B931-A66DCC960259}" type="datetimeFigureOut">
               <a:rPr lang="en-US" smtClean="0"/>
-              <a:t>4/11/12</a:t>
+              <a:t>5/5/12</a:t>
             </a:fld>
             <a:endParaRPr lang="en-US"/>
           </a:p>
@@ -7001,7 +7015,7 @@
           <a:p>
             <a:fld id="{12D17103-1748-4847-B931-A66DCC960259}" type="datetimeFigureOut">
               <a:rPr lang="en-US" smtClean="0"/>
-              <a:t>4/11/12</a:t>
+              <a:t>5/5/12</a:t>
             </a:fld>
             <a:endParaRPr lang="en-US"/>
           </a:p>
@@ -8453,7 +8467,12 @@
             <p:ph idx="1"/>
           </p:nvPr>
         </p:nvSpPr>
-        <p:spPr/>
+        <p:spPr>
+          <a:xfrm>
+            <a:off x="457200" y="1488983"/>
+            <a:ext cx="8229600" cy="4974838"/>
+          </a:xfrm>
+        </p:spPr>
         <p:txBody>
           <a:bodyPr>
             <a:normAutofit/>
@@ -8491,15 +8510,24 @@
           <a:p>
             <a:r>
               <a:rPr lang="en-US" sz="2800" dirty="0" smtClean="0"/>
-              <a:t>Bugs addressed through Google </a:t>
-            </a:r>
-            <a:r>
-              <a:rPr lang="en-US" sz="2800" smtClean="0"/>
-              <a:t>Code Issues Board</a:t>
-            </a:r>
-          </a:p>
-          <a:p>
-            <a:endParaRPr lang="en-US" sz="2800" dirty="0"/>
+              <a:t>Bugs addressed through Google Code Issues </a:t>
+            </a:r>
+            <a:r>
+              <a:rPr lang="en-US" sz="2800" dirty="0" smtClean="0"/>
+              <a:t>Board &amp; at Group Meetings</a:t>
+            </a:r>
+          </a:p>
+          <a:p>
+            <a:r>
+              <a:rPr lang="en-US" sz="2800" dirty="0" smtClean="0"/>
+              <a:t>Simple Programs (Tutorial)</a:t>
+            </a:r>
+          </a:p>
+          <a:p>
+            <a:r>
+              <a:rPr lang="en-US" sz="2800" dirty="0" smtClean="0"/>
+              <a:t>Characteristic Programs: Find the coffee places around Columbia!</a:t>
+            </a:r>
           </a:p>
         </p:txBody>
       </p:sp>
@@ -8510,7 +8538,7 @@
           <p:nvPr>
             <p:extLst>
               <p:ext uri="{D42A27DB-BD31-4B8C-83A1-F6EECF244321}">
-                <p14:modId xmlns:p14="http://schemas.microsoft.com/office/powerpoint/2010/main" val="1981708479"/>
+                <p14:modId xmlns:p14="http://schemas.microsoft.com/office/powerpoint/2010/main" val="3903477257"/>
               </p:ext>
             </p:extLst>
           </p:nvPr>
@@ -8525,6 +8553,178 @@
           </a:graphicData>
         </a:graphic>
       </p:graphicFrame>
+      <p:sp>
+        <p:nvSpPr>
+          <p:cNvPr id="5" name="Oval 4"/>
+          <p:cNvSpPr/>
+          <p:nvPr/>
+        </p:nvSpPr>
+        <p:spPr>
+          <a:xfrm>
+            <a:off x="5123653" y="1773511"/>
+            <a:ext cx="204922" cy="204922"/>
+          </a:xfrm>
+          <a:prstGeom prst="ellipse">
+            <a:avLst/>
+          </a:prstGeom>
+        </p:spPr>
+        <p:style>
+          <a:lnRef idx="0">
+            <a:schemeClr val="lt1">
+              <a:hueOff val="0"/>
+              <a:satOff val="0"/>
+              <a:lumOff val="0"/>
+              <a:alphaOff val="0"/>
+            </a:schemeClr>
+          </a:lnRef>
+          <a:fillRef idx="3">
+            <a:schemeClr val="accent1">
+              <a:hueOff val="0"/>
+              <a:satOff val="0"/>
+              <a:lumOff val="0"/>
+              <a:alphaOff val="0"/>
+            </a:schemeClr>
+          </a:fillRef>
+          <a:effectRef idx="2">
+            <a:schemeClr val="accent1">
+              <a:hueOff val="0"/>
+              <a:satOff val="0"/>
+              <a:lumOff val="0"/>
+              <a:alphaOff val="0"/>
+            </a:schemeClr>
+          </a:effectRef>
+          <a:fontRef idx="minor">
+            <a:schemeClr val="lt1"/>
+          </a:fontRef>
+        </p:style>
+      </p:sp>
+      <p:grpSp>
+        <p:nvGrpSpPr>
+          <p:cNvPr id="6" name="Group 5"/>
+          <p:cNvGrpSpPr/>
+          <p:nvPr/>
+        </p:nvGrpSpPr>
+        <p:grpSpPr>
+          <a:xfrm>
+            <a:off x="5166243" y="1775593"/>
+            <a:ext cx="1618268" cy="2207903"/>
+            <a:chOff x="3926221" y="994003"/>
+            <a:chExt cx="1618268" cy="2207903"/>
+          </a:xfrm>
+        </p:grpSpPr>
+        <p:sp>
+          <p:nvSpPr>
+            <p:cNvPr id="7" name="Rectangle 6"/>
+            <p:cNvSpPr/>
+            <p:nvPr/>
+          </p:nvSpPr>
+          <p:spPr>
+            <a:xfrm>
+              <a:off x="3926221" y="1075452"/>
+              <a:ext cx="1618268" cy="2126454"/>
+            </a:xfrm>
+            <a:prstGeom prst="rect">
+              <a:avLst/>
+            </a:prstGeom>
+          </p:spPr>
+          <p:style>
+            <a:lnRef idx="0">
+              <a:schemeClr val="dk1">
+                <a:alpha val="0"/>
+                <a:hueOff val="0"/>
+                <a:satOff val="0"/>
+                <a:lumOff val="0"/>
+                <a:alphaOff val="0"/>
+              </a:schemeClr>
+            </a:lnRef>
+            <a:fillRef idx="0">
+              <a:schemeClr val="lt1">
+                <a:alpha val="0"/>
+                <a:hueOff val="0"/>
+                <a:satOff val="0"/>
+                <a:lumOff val="0"/>
+                <a:alphaOff val="0"/>
+              </a:schemeClr>
+            </a:fillRef>
+            <a:effectRef idx="0">
+              <a:schemeClr val="lt1">
+                <a:alpha val="0"/>
+                <a:hueOff val="0"/>
+                <a:satOff val="0"/>
+                <a:lumOff val="0"/>
+                <a:alphaOff val="0"/>
+              </a:schemeClr>
+            </a:effectRef>
+            <a:fontRef idx="minor">
+              <a:schemeClr val="tx1">
+                <a:hueOff val="0"/>
+                <a:satOff val="0"/>
+                <a:lumOff val="0"/>
+                <a:alphaOff val="0"/>
+              </a:schemeClr>
+            </a:fontRef>
+          </p:style>
+        </p:sp>
+        <p:sp>
+          <p:nvSpPr>
+            <p:cNvPr id="8" name="Rectangle 7"/>
+            <p:cNvSpPr/>
+            <p:nvPr/>
+          </p:nvSpPr>
+          <p:spPr>
+            <a:xfrm>
+              <a:off x="3926221" y="994003"/>
+              <a:ext cx="1618268" cy="2126454"/>
+            </a:xfrm>
+            <a:prstGeom prst="rect">
+              <a:avLst/>
+            </a:prstGeom>
+          </p:spPr>
+          <p:style>
+            <a:lnRef idx="0">
+              <a:scrgbClr r="0" g="0" b="0"/>
+            </a:lnRef>
+            <a:fillRef idx="0">
+              <a:scrgbClr r="0" g="0" b="0"/>
+            </a:fillRef>
+            <a:effectRef idx="0">
+              <a:scrgbClr r="0" g="0" b="0"/>
+            </a:effectRef>
+            <a:fontRef idx="minor">
+              <a:schemeClr val="tx1">
+                <a:hueOff val="0"/>
+                <a:satOff val="0"/>
+                <a:lumOff val="0"/>
+                <a:alphaOff val="0"/>
+              </a:schemeClr>
+            </a:fontRef>
+          </p:style>
+          <p:txBody>
+            <a:bodyPr spcFirstLastPara="0" vert="horz" wrap="square" lIns="192737" tIns="0" rIns="0" bIns="0" numCol="1" spcCol="1270" anchor="t" anchorCtr="0">
+              <a:noAutofit/>
+            </a:bodyPr>
+            <a:lstStyle/>
+            <a:p>
+              <a:pPr lvl="0" algn="l" defTabSz="711200">
+                <a:lnSpc>
+                  <a:spcPct val="90000"/>
+                </a:lnSpc>
+                <a:spcBef>
+                  <a:spcPct val="0"/>
+                </a:spcBef>
+                <a:spcAft>
+                  <a:spcPct val="35000"/>
+                </a:spcAft>
+              </a:pPr>
+              <a:r>
+                <a:rPr lang="en-US" sz="1600" kern="1200" dirty="0" smtClean="0"/>
+                <a:t>Unexpected Inputs</a:t>
+              </a:r>
+              <a:endParaRPr lang="en-US" sz="1600" kern="1200" dirty="0"/>
+            </a:p>
+          </p:txBody>
+        </p:sp>
+      </p:grpSp>
     </p:spTree>
     <p:extLst>
       <p:ext uri="{BB962C8B-B14F-4D97-AF65-F5344CB8AC3E}">

</xml_diff>

<commit_message>
Slides at the end
</commit_message>
<xml_diff>
--- a/docs/local_present.pptx
+++ b/docs/local_present.pptx
@@ -14,7 +14,10 @@
     <p:sldId id="262" r:id="rId8"/>
     <p:sldId id="263" r:id="rId9"/>
     <p:sldId id="264" r:id="rId10"/>
-    <p:sldId id="265" r:id="rId11"/>
+    <p:sldId id="266" r:id="rId11"/>
+    <p:sldId id="267" r:id="rId12"/>
+    <p:sldId id="268" r:id="rId13"/>
+    <p:sldId id="265" r:id="rId14"/>
   </p:sldIdLst>
   <p:sldSz cx="9144000" cy="6858000" type="screen4x3"/>
   <p:notesSz cx="6858000" cy="9144000"/>
@@ -1135,15 +1138,15 @@
     </dgm:pt>
   </dgm:ptLst>
   <dgm:cxnLst>
+    <dgm:cxn modelId="{CAE30B11-CC2A-154F-8816-60E1EA34C7C5}" type="presOf" srcId="{F74E1E6B-6207-4C49-8AA0-22A4F15A5057}" destId="{FC1CBA4E-6E2F-EE48-861D-3EDED8DB6870}" srcOrd="0" destOrd="0" presId="urn:microsoft.com/office/officeart/2005/8/layout/arrow2"/>
+    <dgm:cxn modelId="{14286A4A-3840-3A4A-9C4F-3CAE3CC8677B}" type="presOf" srcId="{78A1E8F4-D03D-CF48-8943-6DE58C206D5A}" destId="{04A6350A-5479-734D-B89B-58D612C6A7CF}" srcOrd="0" destOrd="0" presId="urn:microsoft.com/office/officeart/2005/8/layout/arrow2"/>
+    <dgm:cxn modelId="{FAD75357-6883-9246-B989-F0EAC5059462}" type="presOf" srcId="{BE88FEAD-BFE7-E34C-BCF5-4BA41C0939D4}" destId="{4A2DFF65-509A-544C-9393-D04075A243CD}" srcOrd="0" destOrd="0" presId="urn:microsoft.com/office/officeart/2005/8/layout/arrow2"/>
+    <dgm:cxn modelId="{9B8B400C-3478-EC45-AE8F-FD6185D62D6E}" srcId="{78A1E8F4-D03D-CF48-8943-6DE58C206D5A}" destId="{F74E1E6B-6207-4C49-8AA0-22A4F15A5057}" srcOrd="0" destOrd="0" parTransId="{7FE7242A-A03D-284D-9AAC-989494308C86}" sibTransId="{AB09869F-DD0F-5744-AF56-BD66C760C450}"/>
+    <dgm:cxn modelId="{E512AC72-1457-444A-8463-06B229732841}" srcId="{78A1E8F4-D03D-CF48-8943-6DE58C206D5A}" destId="{40C8586C-B50B-0645-AD8E-8CB09C38AECA}" srcOrd="1" destOrd="0" parTransId="{4324FEA0-05B9-A949-9C16-54BD0AFE50B1}" sibTransId="{016AD713-C304-014B-A008-BAEA553254F5}"/>
     <dgm:cxn modelId="{632C7F91-17B3-EC43-8D9F-BEDA457231F2}" srcId="{78A1E8F4-D03D-CF48-8943-6DE58C206D5A}" destId="{E90090C8-5943-F040-9633-B1B97AE23E5D}" srcOrd="2" destOrd="0" parTransId="{2FA0ADF9-CDA9-554C-8E99-FF053E5DA4CC}" sibTransId="{5E64DACA-D4B3-264A-BBD0-E39BE5657CE2}"/>
-    <dgm:cxn modelId="{9B8B400C-3478-EC45-AE8F-FD6185D62D6E}" srcId="{78A1E8F4-D03D-CF48-8943-6DE58C206D5A}" destId="{F74E1E6B-6207-4C49-8AA0-22A4F15A5057}" srcOrd="0" destOrd="0" parTransId="{7FE7242A-A03D-284D-9AAC-989494308C86}" sibTransId="{AB09869F-DD0F-5744-AF56-BD66C760C450}"/>
+    <dgm:cxn modelId="{833818DA-5101-BA48-B94A-D284ED81F244}" type="presOf" srcId="{E90090C8-5943-F040-9633-B1B97AE23E5D}" destId="{F3C5ACA4-15AE-564E-83B5-CFFBDB844666}" srcOrd="0" destOrd="0" presId="urn:microsoft.com/office/officeart/2005/8/layout/arrow2"/>
+    <dgm:cxn modelId="{3C4E6C1D-1F8C-494E-B997-7BE74D54A3F4}" type="presOf" srcId="{40C8586C-B50B-0645-AD8E-8CB09C38AECA}" destId="{8A30EBEC-BCB4-5F4D-B7DF-22527C033D70}" srcOrd="0" destOrd="0" presId="urn:microsoft.com/office/officeart/2005/8/layout/arrow2"/>
     <dgm:cxn modelId="{B12CC9F1-F25C-324B-9821-8FDFE7DCFC59}" srcId="{78A1E8F4-D03D-CF48-8943-6DE58C206D5A}" destId="{BE88FEAD-BFE7-E34C-BCF5-4BA41C0939D4}" srcOrd="3" destOrd="0" parTransId="{BEDDEB86-AD04-B449-92C3-631EF3DAB54E}" sibTransId="{809877BC-99BF-F541-8046-500E2E05F0AD}"/>
-    <dgm:cxn modelId="{CAE30B11-CC2A-154F-8816-60E1EA34C7C5}" type="presOf" srcId="{F74E1E6B-6207-4C49-8AA0-22A4F15A5057}" destId="{FC1CBA4E-6E2F-EE48-861D-3EDED8DB6870}" srcOrd="0" destOrd="0" presId="urn:microsoft.com/office/officeart/2005/8/layout/arrow2"/>
-    <dgm:cxn modelId="{FAD75357-6883-9246-B989-F0EAC5059462}" type="presOf" srcId="{BE88FEAD-BFE7-E34C-BCF5-4BA41C0939D4}" destId="{4A2DFF65-509A-544C-9393-D04075A243CD}" srcOrd="0" destOrd="0" presId="urn:microsoft.com/office/officeart/2005/8/layout/arrow2"/>
-    <dgm:cxn modelId="{E512AC72-1457-444A-8463-06B229732841}" srcId="{78A1E8F4-D03D-CF48-8943-6DE58C206D5A}" destId="{40C8586C-B50B-0645-AD8E-8CB09C38AECA}" srcOrd="1" destOrd="0" parTransId="{4324FEA0-05B9-A949-9C16-54BD0AFE50B1}" sibTransId="{016AD713-C304-014B-A008-BAEA553254F5}"/>
-    <dgm:cxn modelId="{3C4E6C1D-1F8C-494E-B997-7BE74D54A3F4}" type="presOf" srcId="{40C8586C-B50B-0645-AD8E-8CB09C38AECA}" destId="{8A30EBEC-BCB4-5F4D-B7DF-22527C033D70}" srcOrd="0" destOrd="0" presId="urn:microsoft.com/office/officeart/2005/8/layout/arrow2"/>
-    <dgm:cxn modelId="{833818DA-5101-BA48-B94A-D284ED81F244}" type="presOf" srcId="{E90090C8-5943-F040-9633-B1B97AE23E5D}" destId="{F3C5ACA4-15AE-564E-83B5-CFFBDB844666}" srcOrd="0" destOrd="0" presId="urn:microsoft.com/office/officeart/2005/8/layout/arrow2"/>
-    <dgm:cxn modelId="{14286A4A-3840-3A4A-9C4F-3CAE3CC8677B}" type="presOf" srcId="{78A1E8F4-D03D-CF48-8943-6DE58C206D5A}" destId="{04A6350A-5479-734D-B89B-58D612C6A7CF}" srcOrd="0" destOrd="0" presId="urn:microsoft.com/office/officeart/2005/8/layout/arrow2"/>
     <dgm:cxn modelId="{65866AB4-D3ED-A548-894C-4B4A98D610BC}" type="presParOf" srcId="{04A6350A-5479-734D-B89B-58D612C6A7CF}" destId="{42224D65-0275-CB45-8546-C7B6A8995E25}" srcOrd="0" destOrd="0" presId="urn:microsoft.com/office/officeart/2005/8/layout/arrow2"/>
     <dgm:cxn modelId="{85E1247F-0FDD-2147-AA2A-22C8FCA6C6EC}" type="presParOf" srcId="{04A6350A-5479-734D-B89B-58D612C6A7CF}" destId="{81D78D91-6403-3E4F-9398-B2B69D4255E4}" srcOrd="1" destOrd="0" presId="urn:microsoft.com/office/officeart/2005/8/layout/arrow2"/>
     <dgm:cxn modelId="{4DD1DD6B-7A2F-984E-9F8D-D68054BCDA62}" type="presParOf" srcId="{81D78D91-6403-3E4F-9398-B2B69D4255E4}" destId="{12253921-DF7F-164A-ACD8-7BFE2B59D4EA}" srcOrd="0" destOrd="0" presId="urn:microsoft.com/office/officeart/2005/8/layout/arrow2"/>
@@ -1159,14 +1162,14 @@
   <dgm:whole/>
   <dgm:extLst>
     <a:ext uri="http://schemas.microsoft.com/office/drawing/2008/diagram">
-      <dsp:dataModelExt xmlns:dsp="http://schemas.microsoft.com/office/drawing/2008/diagram" relId="rId6" minVer="http://schemas.openxmlformats.org/drawingml/2006/diagram"/>
+      <dsp:dataModelExt xmlns:dsp="http://schemas.microsoft.com/office/drawing/2008/diagram" xmlns="" relId="rId6" minVer="http://schemas.openxmlformats.org/drawingml/2006/diagram"/>
     </a:ext>
   </dgm:extLst>
 </dgm:dataModel>
 </file>
 
 <file path=ppt/diagrams/drawing1.xml><?xml version="1.0" encoding="utf-8"?>
-<dsp:drawing xmlns:dgm="http://schemas.openxmlformats.org/drawingml/2006/diagram" xmlns:dsp="http://schemas.microsoft.com/office/drawing/2008/diagram" xmlns:a="http://schemas.openxmlformats.org/drawingml/2006/main">
+<dsp:drawing xmlns:dgm="http://schemas.openxmlformats.org/drawingml/2006/diagram" xmlns:a="http://schemas.openxmlformats.org/drawingml/2006/main" xmlns:dsp="http://schemas.microsoft.com/office/drawing/2008/diagram">
   <dsp:spTree>
     <dsp:nvGrpSpPr>
       <dsp:cNvPr id="0" name=""/>
@@ -4590,7 +4593,8 @@
           <a:p>
             <a:fld id="{12D17103-1748-4847-B931-A66DCC960259}" type="datetimeFigureOut">
               <a:rPr lang="en-US" smtClean="0"/>
-              <a:t>5/6/12</a:t>
+              <a:pPr/>
+              <a:t>5/6/2012</a:t>
             </a:fld>
             <a:endParaRPr lang="en-US"/>
           </a:p>
@@ -4632,6 +4636,7 @@
           <a:p>
             <a:fld id="{BE24168B-5171-1E4C-88AD-08B9EAC7E323}" type="slidenum">
               <a:rPr lang="en-US" smtClean="0"/>
+              <a:pPr/>
               <a:t>‹#›</a:t>
             </a:fld>
             <a:endParaRPr lang="en-US"/>
@@ -4641,7 +4646,7 @@
     </p:spTree>
     <p:extLst>
       <p:ext uri="{BB962C8B-B14F-4D97-AF65-F5344CB8AC3E}">
-        <p14:creationId xmlns:p14="http://schemas.microsoft.com/office/powerpoint/2010/main" val="3231040429"/>
+        <p14:creationId xmlns:p14="http://schemas.microsoft.com/office/powerpoint/2010/main" xmlns="" val="3231040429"/>
       </p:ext>
     </p:extLst>
   </p:cSld>
@@ -4760,7 +4765,8 @@
           <a:p>
             <a:fld id="{12D17103-1748-4847-B931-A66DCC960259}" type="datetimeFigureOut">
               <a:rPr lang="en-US" smtClean="0"/>
-              <a:t>5/6/12</a:t>
+              <a:pPr/>
+              <a:t>5/6/2012</a:t>
             </a:fld>
             <a:endParaRPr lang="en-US"/>
           </a:p>
@@ -4802,6 +4808,7 @@
           <a:p>
             <a:fld id="{BE24168B-5171-1E4C-88AD-08B9EAC7E323}" type="slidenum">
               <a:rPr lang="en-US" smtClean="0"/>
+              <a:pPr/>
               <a:t>‹#›</a:t>
             </a:fld>
             <a:endParaRPr lang="en-US"/>
@@ -4811,7 +4818,7 @@
     </p:spTree>
     <p:extLst>
       <p:ext uri="{BB962C8B-B14F-4D97-AF65-F5344CB8AC3E}">
-        <p14:creationId xmlns:p14="http://schemas.microsoft.com/office/powerpoint/2010/main" val="601949194"/>
+        <p14:creationId xmlns:p14="http://schemas.microsoft.com/office/powerpoint/2010/main" xmlns="" val="601949194"/>
       </p:ext>
     </p:extLst>
   </p:cSld>
@@ -4940,7 +4947,8 @@
           <a:p>
             <a:fld id="{12D17103-1748-4847-B931-A66DCC960259}" type="datetimeFigureOut">
               <a:rPr lang="en-US" smtClean="0"/>
-              <a:t>5/6/12</a:t>
+              <a:pPr/>
+              <a:t>5/6/2012</a:t>
             </a:fld>
             <a:endParaRPr lang="en-US"/>
           </a:p>
@@ -4982,6 +4990,7 @@
           <a:p>
             <a:fld id="{BE24168B-5171-1E4C-88AD-08B9EAC7E323}" type="slidenum">
               <a:rPr lang="en-US" smtClean="0"/>
+              <a:pPr/>
               <a:t>‹#›</a:t>
             </a:fld>
             <a:endParaRPr lang="en-US"/>
@@ -4991,7 +5000,7 @@
     </p:spTree>
     <p:extLst>
       <p:ext uri="{BB962C8B-B14F-4D97-AF65-F5344CB8AC3E}">
-        <p14:creationId xmlns:p14="http://schemas.microsoft.com/office/powerpoint/2010/main" val="2366487477"/>
+        <p14:creationId xmlns:p14="http://schemas.microsoft.com/office/powerpoint/2010/main" xmlns="" val="2366487477"/>
       </p:ext>
     </p:extLst>
   </p:cSld>
@@ -5110,7 +5119,8 @@
           <a:p>
             <a:fld id="{12D17103-1748-4847-B931-A66DCC960259}" type="datetimeFigureOut">
               <a:rPr lang="en-US" smtClean="0"/>
-              <a:t>5/6/12</a:t>
+              <a:pPr/>
+              <a:t>5/6/2012</a:t>
             </a:fld>
             <a:endParaRPr lang="en-US"/>
           </a:p>
@@ -5152,6 +5162,7 @@
           <a:p>
             <a:fld id="{BE24168B-5171-1E4C-88AD-08B9EAC7E323}" type="slidenum">
               <a:rPr lang="en-US" smtClean="0"/>
+              <a:pPr/>
               <a:t>‹#›</a:t>
             </a:fld>
             <a:endParaRPr lang="en-US"/>
@@ -5161,7 +5172,7 @@
     </p:spTree>
     <p:extLst>
       <p:ext uri="{BB962C8B-B14F-4D97-AF65-F5344CB8AC3E}">
-        <p14:creationId xmlns:p14="http://schemas.microsoft.com/office/powerpoint/2010/main" val="3805192695"/>
+        <p14:creationId xmlns:p14="http://schemas.microsoft.com/office/powerpoint/2010/main" xmlns="" val="3805192695"/>
       </p:ext>
     </p:extLst>
   </p:cSld>
@@ -5356,7 +5367,8 @@
           <a:p>
             <a:fld id="{12D17103-1748-4847-B931-A66DCC960259}" type="datetimeFigureOut">
               <a:rPr lang="en-US" smtClean="0"/>
-              <a:t>5/6/12</a:t>
+              <a:pPr/>
+              <a:t>5/6/2012</a:t>
             </a:fld>
             <a:endParaRPr lang="en-US"/>
           </a:p>
@@ -5398,6 +5410,7 @@
           <a:p>
             <a:fld id="{BE24168B-5171-1E4C-88AD-08B9EAC7E323}" type="slidenum">
               <a:rPr lang="en-US" smtClean="0"/>
+              <a:pPr/>
               <a:t>‹#›</a:t>
             </a:fld>
             <a:endParaRPr lang="en-US"/>
@@ -5407,7 +5420,7 @@
     </p:spTree>
     <p:extLst>
       <p:ext uri="{BB962C8B-B14F-4D97-AF65-F5344CB8AC3E}">
-        <p14:creationId xmlns:p14="http://schemas.microsoft.com/office/powerpoint/2010/main" val="489557129"/>
+        <p14:creationId xmlns:p14="http://schemas.microsoft.com/office/powerpoint/2010/main" xmlns="" val="489557129"/>
       </p:ext>
     </p:extLst>
   </p:cSld>
@@ -5644,7 +5657,8 @@
           <a:p>
             <a:fld id="{12D17103-1748-4847-B931-A66DCC960259}" type="datetimeFigureOut">
               <a:rPr lang="en-US" smtClean="0"/>
-              <a:t>5/6/12</a:t>
+              <a:pPr/>
+              <a:t>5/6/2012</a:t>
             </a:fld>
             <a:endParaRPr lang="en-US"/>
           </a:p>
@@ -5686,6 +5700,7 @@
           <a:p>
             <a:fld id="{BE24168B-5171-1E4C-88AD-08B9EAC7E323}" type="slidenum">
               <a:rPr lang="en-US" smtClean="0"/>
+              <a:pPr/>
               <a:t>‹#›</a:t>
             </a:fld>
             <a:endParaRPr lang="en-US"/>
@@ -5695,7 +5710,7 @@
     </p:spTree>
     <p:extLst>
       <p:ext uri="{BB962C8B-B14F-4D97-AF65-F5344CB8AC3E}">
-        <p14:creationId xmlns:p14="http://schemas.microsoft.com/office/powerpoint/2010/main" val="237749449"/>
+        <p14:creationId xmlns:p14="http://schemas.microsoft.com/office/powerpoint/2010/main" xmlns="" val="237749449"/>
       </p:ext>
     </p:extLst>
   </p:cSld>
@@ -6066,7 +6081,8 @@
           <a:p>
             <a:fld id="{12D17103-1748-4847-B931-A66DCC960259}" type="datetimeFigureOut">
               <a:rPr lang="en-US" smtClean="0"/>
-              <a:t>5/6/12</a:t>
+              <a:pPr/>
+              <a:t>5/6/2012</a:t>
             </a:fld>
             <a:endParaRPr lang="en-US"/>
           </a:p>
@@ -6108,6 +6124,7 @@
           <a:p>
             <a:fld id="{BE24168B-5171-1E4C-88AD-08B9EAC7E323}" type="slidenum">
               <a:rPr lang="en-US" smtClean="0"/>
+              <a:pPr/>
               <a:t>‹#›</a:t>
             </a:fld>
             <a:endParaRPr lang="en-US"/>
@@ -6117,7 +6134,7 @@
     </p:spTree>
     <p:extLst>
       <p:ext uri="{BB962C8B-B14F-4D97-AF65-F5344CB8AC3E}">
-        <p14:creationId xmlns:p14="http://schemas.microsoft.com/office/powerpoint/2010/main" val="2754041824"/>
+        <p14:creationId xmlns:p14="http://schemas.microsoft.com/office/powerpoint/2010/main" xmlns="" val="2754041824"/>
       </p:ext>
     </p:extLst>
   </p:cSld>
@@ -6184,7 +6201,8 @@
           <a:p>
             <a:fld id="{12D17103-1748-4847-B931-A66DCC960259}" type="datetimeFigureOut">
               <a:rPr lang="en-US" smtClean="0"/>
-              <a:t>5/6/12</a:t>
+              <a:pPr/>
+              <a:t>5/6/2012</a:t>
             </a:fld>
             <a:endParaRPr lang="en-US"/>
           </a:p>
@@ -6226,6 +6244,7 @@
           <a:p>
             <a:fld id="{BE24168B-5171-1E4C-88AD-08B9EAC7E323}" type="slidenum">
               <a:rPr lang="en-US" smtClean="0"/>
+              <a:pPr/>
               <a:t>‹#›</a:t>
             </a:fld>
             <a:endParaRPr lang="en-US"/>
@@ -6235,7 +6254,7 @@
     </p:spTree>
     <p:extLst>
       <p:ext uri="{BB962C8B-B14F-4D97-AF65-F5344CB8AC3E}">
-        <p14:creationId xmlns:p14="http://schemas.microsoft.com/office/powerpoint/2010/main" val="346641713"/>
+        <p14:creationId xmlns:p14="http://schemas.microsoft.com/office/powerpoint/2010/main" xmlns="" val="346641713"/>
       </p:ext>
     </p:extLst>
   </p:cSld>
@@ -6279,7 +6298,8 @@
           <a:p>
             <a:fld id="{12D17103-1748-4847-B931-A66DCC960259}" type="datetimeFigureOut">
               <a:rPr lang="en-US" smtClean="0"/>
-              <a:t>5/6/12</a:t>
+              <a:pPr/>
+              <a:t>5/6/2012</a:t>
             </a:fld>
             <a:endParaRPr lang="en-US"/>
           </a:p>
@@ -6321,6 +6341,7 @@
           <a:p>
             <a:fld id="{BE24168B-5171-1E4C-88AD-08B9EAC7E323}" type="slidenum">
               <a:rPr lang="en-US" smtClean="0"/>
+              <a:pPr/>
               <a:t>‹#›</a:t>
             </a:fld>
             <a:endParaRPr lang="en-US"/>
@@ -6330,7 +6351,7 @@
     </p:spTree>
     <p:extLst>
       <p:ext uri="{BB962C8B-B14F-4D97-AF65-F5344CB8AC3E}">
-        <p14:creationId xmlns:p14="http://schemas.microsoft.com/office/powerpoint/2010/main" val="2972177166"/>
+        <p14:creationId xmlns:p14="http://schemas.microsoft.com/office/powerpoint/2010/main" xmlns="" val="2972177166"/>
       </p:ext>
     </p:extLst>
   </p:cSld>
@@ -6556,7 +6577,8 @@
           <a:p>
             <a:fld id="{12D17103-1748-4847-B931-A66DCC960259}" type="datetimeFigureOut">
               <a:rPr lang="en-US" smtClean="0"/>
-              <a:t>5/6/12</a:t>
+              <a:pPr/>
+              <a:t>5/6/2012</a:t>
             </a:fld>
             <a:endParaRPr lang="en-US"/>
           </a:p>
@@ -6598,6 +6620,7 @@
           <a:p>
             <a:fld id="{BE24168B-5171-1E4C-88AD-08B9EAC7E323}" type="slidenum">
               <a:rPr lang="en-US" smtClean="0"/>
+              <a:pPr/>
               <a:t>‹#›</a:t>
             </a:fld>
             <a:endParaRPr lang="en-US"/>
@@ -6607,7 +6630,7 @@
     </p:spTree>
     <p:extLst>
       <p:ext uri="{BB962C8B-B14F-4D97-AF65-F5344CB8AC3E}">
-        <p14:creationId xmlns:p14="http://schemas.microsoft.com/office/powerpoint/2010/main" val="4232780802"/>
+        <p14:creationId xmlns:p14="http://schemas.microsoft.com/office/powerpoint/2010/main" xmlns="" val="4232780802"/>
       </p:ext>
     </p:extLst>
   </p:cSld>
@@ -6809,7 +6832,8 @@
           <a:p>
             <a:fld id="{12D17103-1748-4847-B931-A66DCC960259}" type="datetimeFigureOut">
               <a:rPr lang="en-US" smtClean="0"/>
-              <a:t>5/6/12</a:t>
+              <a:pPr/>
+              <a:t>5/6/2012</a:t>
             </a:fld>
             <a:endParaRPr lang="en-US"/>
           </a:p>
@@ -6851,6 +6875,7 @@
           <a:p>
             <a:fld id="{BE24168B-5171-1E4C-88AD-08B9EAC7E323}" type="slidenum">
               <a:rPr lang="en-US" smtClean="0"/>
+              <a:pPr/>
               <a:t>‹#›</a:t>
             </a:fld>
             <a:endParaRPr lang="en-US"/>
@@ -6860,7 +6885,7 @@
     </p:spTree>
     <p:extLst>
       <p:ext uri="{BB962C8B-B14F-4D97-AF65-F5344CB8AC3E}">
-        <p14:creationId xmlns:p14="http://schemas.microsoft.com/office/powerpoint/2010/main" val="2675457367"/>
+        <p14:creationId xmlns:p14="http://schemas.microsoft.com/office/powerpoint/2010/main" xmlns="" val="2675457367"/>
       </p:ext>
     </p:extLst>
   </p:cSld>
@@ -7022,7 +7047,8 @@
           <a:p>
             <a:fld id="{12D17103-1748-4847-B931-A66DCC960259}" type="datetimeFigureOut">
               <a:rPr lang="en-US" smtClean="0"/>
-              <a:t>5/6/12</a:t>
+              <a:pPr/>
+              <a:t>5/6/2012</a:t>
             </a:fld>
             <a:endParaRPr lang="en-US"/>
           </a:p>
@@ -7100,6 +7126,7 @@
           <a:p>
             <a:fld id="{BE24168B-5171-1E4C-88AD-08B9EAC7E323}" type="slidenum">
               <a:rPr lang="en-US" smtClean="0"/>
+              <a:pPr/>
               <a:t>‹#›</a:t>
             </a:fld>
             <a:endParaRPr lang="en-US"/>
@@ -7109,7 +7136,7 @@
     </p:spTree>
     <p:extLst>
       <p:ext uri="{BB962C8B-B14F-4D97-AF65-F5344CB8AC3E}">
-        <p14:creationId xmlns:p14="http://schemas.microsoft.com/office/powerpoint/2010/main" val="528073203"/>
+        <p14:creationId xmlns:p14="http://schemas.microsoft.com/office/powerpoint/2010/main" xmlns="" val="528073203"/>
       </p:ext>
     </p:extLst>
   </p:cSld>
@@ -7410,7 +7437,7 @@
             <a:alphaModFix/>
             <a:extLst>
               <a:ext uri="{BEBA8EAE-BF5A-486C-A8C5-ECC9F3942E4B}">
-                <a14:imgProps xmlns:a14="http://schemas.microsoft.com/office/drawing/2010/main">
+                <a14:imgProps xmlns:a14="http://schemas.microsoft.com/office/drawing/2010/main" xmlns="">
                   <a14:imgLayer r:embed="rId3">
                     <a14:imgEffect>
                       <a14:sharpenSoften amount="-30000"/>
@@ -7422,7 +7449,7 @@
                 </a14:imgProps>
               </a:ext>
               <a:ext uri="{28A0092B-C50C-407E-A947-70E740481C1C}">
-                <a14:useLocalDpi xmlns:a14="http://schemas.microsoft.com/office/drawing/2010/main" val="0"/>
+                <a14:useLocalDpi xmlns:a14="http://schemas.microsoft.com/office/drawing/2010/main" xmlns="" val="0"/>
               </a:ext>
             </a:extLst>
           </a:blip>
@@ -7742,7 +7769,7 @@
     </p:spTree>
     <p:extLst>
       <p:ext uri="{BB962C8B-B14F-4D97-AF65-F5344CB8AC3E}">
-        <p14:creationId xmlns:p14="http://schemas.microsoft.com/office/powerpoint/2010/main" val="3449312616"/>
+        <p14:creationId xmlns:p14="http://schemas.microsoft.com/office/powerpoint/2010/main" xmlns="" val="3449312616"/>
       </p:ext>
     </p:extLst>
   </p:cSld>
@@ -7752,7 +7779,7 @@
   <p:timing>
     <p:tnLst>
       <p:par>
-        <p:cTn xmlns:p14="http://schemas.microsoft.com/office/powerpoint/2010/main" id="1" dur="indefinite" restart="never" nodeType="tmRoot"/>
+        <p:cTn id="1" dur="indefinite" restart="never" nodeType="tmRoot"/>
       </p:par>
     </p:tnLst>
   </p:timing>
@@ -7793,6 +7820,304 @@
           <a:p>
             <a:r>
               <a:rPr lang="en-US" dirty="0" smtClean="0"/>
+              <a:t>Lessons Learned</a:t>
+            </a:r>
+            <a:endParaRPr lang="en-US" dirty="0"/>
+          </a:p>
+        </p:txBody>
+      </p:sp>
+      <p:sp>
+        <p:nvSpPr>
+          <p:cNvPr id="5" name="Content Placeholder 4"/>
+          <p:cNvSpPr>
+            <a:spLocks noGrp="1"/>
+          </p:cNvSpPr>
+          <p:nvPr>
+            <p:ph idx="1"/>
+          </p:nvPr>
+        </p:nvSpPr>
+        <p:spPr/>
+        <p:txBody>
+          <a:bodyPr/>
+          <a:lstStyle/>
+          <a:p>
+            <a:r>
+              <a:rPr lang="en-US" dirty="0" smtClean="0"/>
+              <a:t>Grammar is powerful – so don’t spend too much time on it!</a:t>
+            </a:r>
+          </a:p>
+          <a:p>
+            <a:r>
+              <a:rPr lang="en-US" dirty="0" smtClean="0"/>
+              <a:t>Don’t be afraid of building the AST</a:t>
+            </a:r>
+          </a:p>
+          <a:p>
+            <a:r>
+              <a:rPr lang="en-US" dirty="0" smtClean="0"/>
+              <a:t>Conflicts are inevitable, handling them is an art</a:t>
+            </a:r>
+          </a:p>
+          <a:p>
+            <a:r>
+              <a:rPr lang="en-US" dirty="0" smtClean="0"/>
+              <a:t>Paradigm shift: can’t take our favorite programming languages for granted anymore</a:t>
+            </a:r>
+          </a:p>
+          <a:p>
+            <a:endParaRPr lang="en-US" dirty="0"/>
+          </a:p>
+        </p:txBody>
+      </p:sp>
+    </p:spTree>
+  </p:cSld>
+  <p:clrMapOvr>
+    <a:masterClrMapping/>
+  </p:clrMapOvr>
+</p:sld>
+</file>
+
+<file path=ppt/slides/slide11.xml><?xml version="1.0" encoding="utf-8"?>
+<p:sld xmlns:a="http://schemas.openxmlformats.org/drawingml/2006/main" xmlns:r="http://schemas.openxmlformats.org/officeDocument/2006/relationships" xmlns:p="http://schemas.openxmlformats.org/presentationml/2006/main">
+  <p:cSld>
+    <p:spTree>
+      <p:nvGrpSpPr>
+        <p:cNvPr id="1" name=""/>
+        <p:cNvGrpSpPr/>
+        <p:nvPr/>
+      </p:nvGrpSpPr>
+      <p:grpSpPr>
+        <a:xfrm>
+          <a:off x="0" y="0"/>
+          <a:ext cx="0" cy="0"/>
+          <a:chOff x="0" y="0"/>
+          <a:chExt cx="0" cy="0"/>
+        </a:xfrm>
+      </p:grpSpPr>
+      <p:sp>
+        <p:nvSpPr>
+          <p:cNvPr id="4" name="Title 3"/>
+          <p:cNvSpPr>
+            <a:spLocks noGrp="1"/>
+          </p:cNvSpPr>
+          <p:nvPr>
+            <p:ph type="title"/>
+          </p:nvPr>
+        </p:nvSpPr>
+        <p:spPr/>
+        <p:txBody>
+          <a:bodyPr/>
+          <a:lstStyle/>
+          <a:p>
+            <a:r>
+              <a:rPr lang="en-US" dirty="0" smtClean="0"/>
+              <a:t>The good. The bad</a:t>
+            </a:r>
+            <a:endParaRPr lang="en-US" dirty="0"/>
+          </a:p>
+        </p:txBody>
+      </p:sp>
+      <p:sp>
+        <p:nvSpPr>
+          <p:cNvPr id="5" name="Content Placeholder 4"/>
+          <p:cNvSpPr>
+            <a:spLocks noGrp="1"/>
+          </p:cNvSpPr>
+          <p:nvPr>
+            <p:ph sz="half" idx="1"/>
+          </p:nvPr>
+        </p:nvSpPr>
+        <p:spPr/>
+        <p:txBody>
+          <a:bodyPr/>
+          <a:lstStyle/>
+          <a:p>
+            <a:r>
+              <a:rPr lang="en-US" dirty="0" smtClean="0"/>
+              <a:t>Wonderfully organized team!</a:t>
+            </a:r>
+          </a:p>
+          <a:p>
+            <a:r>
+              <a:rPr lang="en-US" dirty="0" smtClean="0"/>
+              <a:t>Updating each other often</a:t>
+            </a:r>
+          </a:p>
+          <a:p>
+            <a:r>
+              <a:rPr lang="en-US" dirty="0" smtClean="0"/>
+              <a:t>Delightfully ahead of schedule</a:t>
+            </a:r>
+            <a:endParaRPr lang="en-US" dirty="0"/>
+          </a:p>
+        </p:txBody>
+      </p:sp>
+      <p:sp>
+        <p:nvSpPr>
+          <p:cNvPr id="6" name="Content Placeholder 5"/>
+          <p:cNvSpPr>
+            <a:spLocks noGrp="1"/>
+          </p:cNvSpPr>
+          <p:nvPr>
+            <p:ph sz="half" idx="2"/>
+          </p:nvPr>
+        </p:nvSpPr>
+        <p:spPr/>
+        <p:txBody>
+          <a:bodyPr/>
+          <a:lstStyle/>
+          <a:p>
+            <a:r>
+              <a:rPr lang="en-US" dirty="0" smtClean="0"/>
+              <a:t>Too much time spent on grammar</a:t>
+            </a:r>
+          </a:p>
+          <a:p>
+            <a:r>
+              <a:rPr lang="en-US" dirty="0" smtClean="0"/>
+              <a:t>Less on AST</a:t>
+            </a:r>
+          </a:p>
+          <a:p>
+            <a:r>
+              <a:rPr lang="en-US" dirty="0" smtClean="0"/>
+              <a:t>Didn’t get local programs up and running till the last week</a:t>
+            </a:r>
+            <a:endParaRPr lang="en-US" dirty="0"/>
+          </a:p>
+        </p:txBody>
+      </p:sp>
+    </p:spTree>
+  </p:cSld>
+  <p:clrMapOvr>
+    <a:masterClrMapping/>
+  </p:clrMapOvr>
+</p:sld>
+</file>
+
+<file path=ppt/slides/slide12.xml><?xml version="1.0" encoding="utf-8"?>
+<p:sld xmlns:a="http://schemas.openxmlformats.org/drawingml/2006/main" xmlns:r="http://schemas.openxmlformats.org/officeDocument/2006/relationships" xmlns:p="http://schemas.openxmlformats.org/presentationml/2006/main">
+  <p:cSld>
+    <p:spTree>
+      <p:nvGrpSpPr>
+        <p:cNvPr id="1" name=""/>
+        <p:cNvGrpSpPr/>
+        <p:nvPr/>
+      </p:nvGrpSpPr>
+      <p:grpSpPr>
+        <a:xfrm>
+          <a:off x="0" y="0"/>
+          <a:ext cx="0" cy="0"/>
+          <a:chOff x="0" y="0"/>
+          <a:chExt cx="0" cy="0"/>
+        </a:xfrm>
+      </p:grpSpPr>
+      <p:sp>
+        <p:nvSpPr>
+          <p:cNvPr id="2" name="Title 1"/>
+          <p:cNvSpPr>
+            <a:spLocks noGrp="1"/>
+          </p:cNvSpPr>
+          <p:nvPr>
+            <p:ph type="title"/>
+          </p:nvPr>
+        </p:nvSpPr>
+        <p:spPr/>
+        <p:txBody>
+          <a:bodyPr>
+            <a:noAutofit/>
+          </a:bodyPr>
+          <a:lstStyle/>
+          <a:p>
+            <a:pPr algn="ctr"/>
+            <a:r>
+              <a:rPr lang="en-US" sz="4400" dirty="0" smtClean="0"/>
+              <a:t>Use our language!</a:t>
+            </a:r>
+            <a:endParaRPr lang="en-US" sz="4400" dirty="0"/>
+          </a:p>
+        </p:txBody>
+      </p:sp>
+      <p:sp>
+        <p:nvSpPr>
+          <p:cNvPr id="6" name="Picture Placeholder 5"/>
+          <p:cNvSpPr>
+            <a:spLocks noGrp="1"/>
+          </p:cNvSpPr>
+          <p:nvPr>
+            <p:ph type="pic" idx="1"/>
+          </p:nvPr>
+        </p:nvSpPr>
+        <p:spPr/>
+      </p:sp>
+      <p:sp>
+        <p:nvSpPr>
+          <p:cNvPr id="5" name="Content Placeholder 4"/>
+          <p:cNvSpPr>
+            <a:spLocks noGrp="1"/>
+          </p:cNvSpPr>
+          <p:nvPr>
+            <p:ph type="body" sz="half" idx="2"/>
+          </p:nvPr>
+        </p:nvSpPr>
+        <p:spPr/>
+        <p:txBody>
+          <a:bodyPr/>
+          <a:lstStyle/>
+          <a:p>
+            <a:pPr algn="ctr"/>
+            <a:r>
+              <a:rPr lang="en-US" sz="2800" dirty="0" smtClean="0"/>
+              <a:t>It’s so simple… No really it is!</a:t>
+            </a:r>
+          </a:p>
+          <a:p>
+            <a:endParaRPr lang="en-US" dirty="0"/>
+          </a:p>
+        </p:txBody>
+      </p:sp>
+    </p:spTree>
+  </p:cSld>
+  <p:clrMapOvr>
+    <a:masterClrMapping/>
+  </p:clrMapOvr>
+</p:sld>
+</file>
+
+<file path=ppt/slides/slide13.xml><?xml version="1.0" encoding="utf-8"?>
+<p:sld xmlns:a="http://schemas.openxmlformats.org/drawingml/2006/main" xmlns:r="http://schemas.openxmlformats.org/officeDocument/2006/relationships" xmlns:p="http://schemas.openxmlformats.org/presentationml/2006/main">
+  <p:cSld>
+    <p:spTree>
+      <p:nvGrpSpPr>
+        <p:cNvPr id="1" name=""/>
+        <p:cNvGrpSpPr/>
+        <p:nvPr/>
+      </p:nvGrpSpPr>
+      <p:grpSpPr>
+        <a:xfrm>
+          <a:off x="0" y="0"/>
+          <a:ext cx="0" cy="0"/>
+          <a:chOff x="0" y="0"/>
+          <a:chExt cx="0" cy="0"/>
+        </a:xfrm>
+      </p:grpSpPr>
+      <p:sp>
+        <p:nvSpPr>
+          <p:cNvPr id="2" name="Title 1"/>
+          <p:cNvSpPr>
+            <a:spLocks noGrp="1"/>
+          </p:cNvSpPr>
+          <p:nvPr>
+            <p:ph type="title"/>
+          </p:nvPr>
+        </p:nvSpPr>
+        <p:spPr/>
+        <p:txBody>
+          <a:bodyPr/>
+          <a:lstStyle/>
+          <a:p>
+            <a:r>
+              <a:rPr lang="en-US" dirty="0" smtClean="0"/>
               <a:t>Questions</a:t>
             </a:r>
             <a:endParaRPr lang="en-US" dirty="0"/>
@@ -7821,7 +8146,7 @@
     </p:spTree>
     <p:extLst>
       <p:ext uri="{BB962C8B-B14F-4D97-AF65-F5344CB8AC3E}">
-        <p14:creationId xmlns:p14="http://schemas.microsoft.com/office/powerpoint/2010/main" val="798869054"/>
+        <p14:creationId xmlns:p14="http://schemas.microsoft.com/office/powerpoint/2010/main" xmlns="" val="798869054"/>
       </p:ext>
     </p:extLst>
   </p:cSld>
@@ -8005,7 +8330,7 @@
     </p:spTree>
     <p:extLst>
       <p:ext uri="{BB962C8B-B14F-4D97-AF65-F5344CB8AC3E}">
-        <p14:creationId xmlns:p14="http://schemas.microsoft.com/office/powerpoint/2010/main" val="215984204"/>
+        <p14:creationId xmlns:p14="http://schemas.microsoft.com/office/powerpoint/2010/main" xmlns="" val="215984204"/>
       </p:ext>
     </p:extLst>
   </p:cSld>
@@ -8015,7 +8340,7 @@
   <p:timing>
     <p:tnLst>
       <p:par>
-        <p:cTn xmlns:p14="http://schemas.microsoft.com/office/powerpoint/2010/main" id="1" dur="indefinite" restart="never" nodeType="tmRoot"/>
+        <p:cTn id="1" dur="indefinite" restart="never" nodeType="tmRoot"/>
       </p:par>
     </p:tnLst>
   </p:timing>
@@ -8122,7 +8447,7 @@
     </p:spTree>
     <p:extLst>
       <p:ext uri="{BB962C8B-B14F-4D97-AF65-F5344CB8AC3E}">
-        <p14:creationId xmlns:p14="http://schemas.microsoft.com/office/powerpoint/2010/main" val="2452047840"/>
+        <p14:creationId xmlns:p14="http://schemas.microsoft.com/office/powerpoint/2010/main" xmlns="" val="2452047840"/>
       </p:ext>
     </p:extLst>
   </p:cSld>
@@ -8211,7 +8536,7 @@
     </p:spTree>
     <p:extLst>
       <p:ext uri="{BB962C8B-B14F-4D97-AF65-F5344CB8AC3E}">
-        <p14:creationId xmlns:p14="http://schemas.microsoft.com/office/powerpoint/2010/main" val="4102193222"/>
+        <p14:creationId xmlns:p14="http://schemas.microsoft.com/office/powerpoint/2010/main" xmlns="" val="4102193222"/>
       </p:ext>
     </p:extLst>
   </p:cSld>
@@ -8267,11 +8592,7 @@
             </a:r>
             <a:r>
               <a:rPr lang="en-US" dirty="0" smtClean="0"/>
-              <a:t> Code </a:t>
-            </a:r>
-            <a:r>
-              <a:rPr lang="en-US" dirty="0" smtClean="0"/>
-              <a:t>Example</a:t>
+              <a:t> Code Example</a:t>
             </a:r>
             <a:endParaRPr lang="en-US" dirty="0"/>
           </a:p>
@@ -9194,7 +9515,6 @@
               <a:rPr lang="en-US" sz="1300" dirty="0"/>
               <a:t>}</a:t>
             </a:r>
-            <a:endParaRPr lang="en-US" sz="1300" dirty="0"/>
           </a:p>
         </p:txBody>
       </p:sp>
@@ -9743,7 +10063,7 @@
     </p:spTree>
     <p:extLst>
       <p:ext uri="{BB962C8B-B14F-4D97-AF65-F5344CB8AC3E}">
-        <p14:creationId xmlns:p14="http://schemas.microsoft.com/office/powerpoint/2010/main" val="1195539260"/>
+        <p14:creationId xmlns:p14="http://schemas.microsoft.com/office/powerpoint/2010/main" xmlns="" val="1195539260"/>
       </p:ext>
     </p:extLst>
   </p:cSld>
@@ -9815,7 +10135,7 @@
     </p:spTree>
     <p:extLst>
       <p:ext uri="{BB962C8B-B14F-4D97-AF65-F5344CB8AC3E}">
-        <p14:creationId xmlns:p14="http://schemas.microsoft.com/office/powerpoint/2010/main" val="452808669"/>
+        <p14:creationId xmlns:p14="http://schemas.microsoft.com/office/powerpoint/2010/main" xmlns="" val="452808669"/>
       </p:ext>
     </p:extLst>
   </p:cSld>
@@ -9891,7 +10211,7 @@
     </p:spTree>
     <p:extLst>
       <p:ext uri="{BB962C8B-B14F-4D97-AF65-F5344CB8AC3E}">
-        <p14:creationId xmlns:p14="http://schemas.microsoft.com/office/powerpoint/2010/main" val="2186752886"/>
+        <p14:creationId xmlns:p14="http://schemas.microsoft.com/office/powerpoint/2010/main" xmlns="" val="2186752886"/>
       </p:ext>
     </p:extLst>
   </p:cSld>
@@ -10018,7 +10338,7 @@
           <p:nvPr>
             <p:extLst>
               <p:ext uri="{D42A27DB-BD31-4B8C-83A1-F6EECF244321}">
-                <p14:modId xmlns:p14="http://schemas.microsoft.com/office/powerpoint/2010/main" val="3903477257"/>
+                <p14:modId xmlns:p14="http://schemas.microsoft.com/office/powerpoint/2010/main" xmlns="" val="3903477257"/>
               </p:ext>
             </p:extLst>
           </p:nvPr>
@@ -10208,7 +10528,7 @@
     </p:spTree>
     <p:extLst>
       <p:ext uri="{BB962C8B-B14F-4D97-AF65-F5344CB8AC3E}">
-        <p14:creationId xmlns:p14="http://schemas.microsoft.com/office/powerpoint/2010/main" val="625530006"/>
+        <p14:creationId xmlns:p14="http://schemas.microsoft.com/office/powerpoint/2010/main" xmlns="" val="625530006"/>
       </p:ext>
     </p:extLst>
   </p:cSld>
@@ -10258,29 +10578,34 @@
           </a:p>
         </p:txBody>
       </p:sp>
-      <p:sp>
-        <p:nvSpPr>
-          <p:cNvPr id="3" name="Content Placeholder 2"/>
-          <p:cNvSpPr>
-            <a:spLocks noGrp="1"/>
-          </p:cNvSpPr>
-          <p:nvPr>
-            <p:ph idx="1"/>
-          </p:nvPr>
-        </p:nvSpPr>
-        <p:spPr/>
-        <p:txBody>
-          <a:bodyPr/>
-          <a:lstStyle/>
-          <a:p>
-            <a:endParaRPr lang="en-US" dirty="0"/>
-          </a:p>
-        </p:txBody>
-      </p:sp>
+      <p:pic>
+        <p:nvPicPr>
+          <p:cNvPr id="4" name="Picture 3" descr="python - xkcd.png"/>
+          <p:cNvPicPr>
+            <a:picLocks noChangeAspect="1"/>
+          </p:cNvPicPr>
+          <p:nvPr/>
+        </p:nvPicPr>
+        <p:blipFill>
+          <a:blip r:embed="rId2"/>
+          <a:stretch>
+            <a:fillRect/>
+          </a:stretch>
+        </p:blipFill>
+        <p:spPr>
+          <a:xfrm>
+            <a:off x="2604164" y="1417638"/>
+            <a:ext cx="4046022" cy="4592782"/>
+          </a:xfrm>
+          <a:prstGeom prst="rect">
+            <a:avLst/>
+          </a:prstGeom>
+        </p:spPr>
+      </p:pic>
     </p:spTree>
     <p:extLst>
       <p:ext uri="{BB962C8B-B14F-4D97-AF65-F5344CB8AC3E}">
-        <p14:creationId xmlns:p14="http://schemas.microsoft.com/office/powerpoint/2010/main" val="239602563"/>
+        <p14:creationId xmlns:p14="http://schemas.microsoft.com/office/powerpoint/2010/main" xmlns="" val="239602563"/>
       </p:ext>
     </p:extLst>
   </p:cSld>

</xml_diff>